<commit_message>
Adding first slide for making people care
</commit_message>
<xml_diff>
--- a/ComputationalFuzzyExtractors-CryptoRump.pptx
+++ b/ComputationalFuzzyExtractors-CryptoRump.pptx
@@ -12,7 +12,7 @@
     <p:sldId id="366" r:id="rId3"/>
     <p:sldId id="315" r:id="rId4"/>
     <p:sldId id="365" r:id="rId5"/>
-    <p:sldId id="324" r:id="rId6"/>
+    <p:sldId id="367" r:id="rId6"/>
   </p:sldIdLst>
   <p:sldSz cx="9144000" cy="6858000" type="screen4x3"/>
   <p:notesSz cx="6858000" cy="9144000"/>
@@ -196,7 +196,7 @@
           <a:p>
             <a:fld id="{941E4532-0A1D-7741-B7F8-C491C4C533AD}" type="datetimeFigureOut">
               <a:rPr lang="en-US" smtClean="0"/>
-              <a:t>8/12/13</a:t>
+              <a:t>8/16/13</a:t>
             </a:fld>
             <a:endParaRPr lang="en-US"/>
           </a:p>
@@ -1651,7 +1651,7 @@
           <a:p>
             <a:fld id="{76183B97-7D03-374D-AECD-E740583BEFF3}" type="datetimeFigureOut">
               <a:rPr lang="en-US" smtClean="0"/>
-              <a:t>8/12/13</a:t>
+              <a:t>8/16/13</a:t>
             </a:fld>
             <a:endParaRPr lang="en-US"/>
           </a:p>
@@ -1821,7 +1821,7 @@
           <a:p>
             <a:fld id="{76183B97-7D03-374D-AECD-E740583BEFF3}" type="datetimeFigureOut">
               <a:rPr lang="en-US" smtClean="0"/>
-              <a:t>8/12/13</a:t>
+              <a:t>8/16/13</a:t>
             </a:fld>
             <a:endParaRPr lang="en-US"/>
           </a:p>
@@ -2001,7 +2001,7 @@
           <a:p>
             <a:fld id="{76183B97-7D03-374D-AECD-E740583BEFF3}" type="datetimeFigureOut">
               <a:rPr lang="en-US" smtClean="0"/>
-              <a:t>8/12/13</a:t>
+              <a:t>8/16/13</a:t>
             </a:fld>
             <a:endParaRPr lang="en-US"/>
           </a:p>
@@ -2171,7 +2171,7 @@
           <a:p>
             <a:fld id="{76183B97-7D03-374D-AECD-E740583BEFF3}" type="datetimeFigureOut">
               <a:rPr lang="en-US" smtClean="0"/>
-              <a:t>8/12/13</a:t>
+              <a:t>8/16/13</a:t>
             </a:fld>
             <a:endParaRPr lang="en-US"/>
           </a:p>
@@ -2417,7 +2417,7 @@
           <a:p>
             <a:fld id="{76183B97-7D03-374D-AECD-E740583BEFF3}" type="datetimeFigureOut">
               <a:rPr lang="en-US" smtClean="0"/>
-              <a:t>8/12/13</a:t>
+              <a:t>8/16/13</a:t>
             </a:fld>
             <a:endParaRPr lang="en-US"/>
           </a:p>
@@ -2705,7 +2705,7 @@
           <a:p>
             <a:fld id="{76183B97-7D03-374D-AECD-E740583BEFF3}" type="datetimeFigureOut">
               <a:rPr lang="en-US" smtClean="0"/>
-              <a:t>8/12/13</a:t>
+              <a:t>8/16/13</a:t>
             </a:fld>
             <a:endParaRPr lang="en-US"/>
           </a:p>
@@ -3127,7 +3127,7 @@
           <a:p>
             <a:fld id="{76183B97-7D03-374D-AECD-E740583BEFF3}" type="datetimeFigureOut">
               <a:rPr lang="en-US" smtClean="0"/>
-              <a:t>8/12/13</a:t>
+              <a:t>8/16/13</a:t>
             </a:fld>
             <a:endParaRPr lang="en-US"/>
           </a:p>
@@ -3245,7 +3245,7 @@
           <a:p>
             <a:fld id="{76183B97-7D03-374D-AECD-E740583BEFF3}" type="datetimeFigureOut">
               <a:rPr lang="en-US" smtClean="0"/>
-              <a:t>8/12/13</a:t>
+              <a:t>8/16/13</a:t>
             </a:fld>
             <a:endParaRPr lang="en-US"/>
           </a:p>
@@ -3340,7 +3340,7 @@
           <a:p>
             <a:fld id="{76183B97-7D03-374D-AECD-E740583BEFF3}" type="datetimeFigureOut">
               <a:rPr lang="en-US" smtClean="0"/>
-              <a:t>8/12/13</a:t>
+              <a:t>8/16/13</a:t>
             </a:fld>
             <a:endParaRPr lang="en-US"/>
           </a:p>
@@ -3617,7 +3617,7 @@
           <a:p>
             <a:fld id="{76183B97-7D03-374D-AECD-E740583BEFF3}" type="datetimeFigureOut">
               <a:rPr lang="en-US" smtClean="0"/>
-              <a:t>8/12/13</a:t>
+              <a:t>8/16/13</a:t>
             </a:fld>
             <a:endParaRPr lang="en-US"/>
           </a:p>
@@ -3870,7 +3870,7 @@
           <a:p>
             <a:fld id="{76183B97-7D03-374D-AECD-E740583BEFF3}" type="datetimeFigureOut">
               <a:rPr lang="en-US" smtClean="0"/>
-              <a:t>8/12/13</a:t>
+              <a:t>8/16/13</a:t>
             </a:fld>
             <a:endParaRPr lang="en-US"/>
           </a:p>
@@ -4083,7 +4083,7 @@
           <a:p>
             <a:fld id="{76183B97-7D03-374D-AECD-E740583BEFF3}" type="datetimeFigureOut">
               <a:rPr lang="en-US" smtClean="0"/>
-              <a:t>8/12/13</a:t>
+              <a:t>8/16/13</a:t>
             </a:fld>
             <a:endParaRPr lang="en-US"/>
           </a:p>
@@ -4575,15 +4575,7 @@
                   <a:schemeClr val="tx1"/>
                 </a:solidFill>
               </a:rPr>
-              <a:t>August 17</a:t>
-            </a:r>
-            <a:r>
-              <a:rPr lang="en-US" altLang="en-US" sz="2000" dirty="0" smtClean="0">
-                <a:solidFill>
-                  <a:schemeClr val="tx1"/>
-                </a:solidFill>
-              </a:rPr>
-              <a:t>, 2013</a:t>
+              <a:t>August 17, 2013</a:t>
             </a:r>
             <a:endParaRPr lang="en-US" altLang="en-US" sz="2000" dirty="0">
               <a:solidFill>
@@ -4849,11 +4841,7 @@
           <a:p>
             <a:r>
               <a:rPr lang="en-US" sz="2400" dirty="0" smtClean="0"/>
-              <a:t>Fuzzy Extractors derive reliable keys from noisy </a:t>
-            </a:r>
-            <a:r>
-              <a:rPr lang="en-US" sz="2400" dirty="0" smtClean="0"/>
-              <a:t>data</a:t>
+              <a:t>Fuzzy Extractors derive reliable keys from noisy data</a:t>
             </a:r>
           </a:p>
           <a:p>
@@ -4950,14 +4938,7 @@
                 <a:latin typeface="Calibri"/>
                 <a:cs typeface="Calibri"/>
               </a:rPr>
-              <a:t>Derive </a:t>
-            </a:r>
-            <a:r>
-              <a:rPr lang="en-US" sz="2000" dirty="0" smtClean="0">
-                <a:latin typeface="Calibri"/>
-                <a:cs typeface="Calibri"/>
-              </a:rPr>
-              <a:t>a key using a </a:t>
+              <a:t>Derive a key using a </a:t>
             </a:r>
             <a:br>
               <a:rPr lang="en-US" sz="2000" dirty="0" smtClean="0">
@@ -5003,17 +4984,7 @@
                 <a:latin typeface="Calibri"/>
                 <a:cs typeface="Calibri"/>
               </a:rPr>
-              <a:t>Secure </a:t>
-            </a:r>
-            <a:r>
-              <a:rPr lang="en-US" sz="2000" i="1" dirty="0" smtClean="0">
-                <a:solidFill>
-                  <a:srgbClr val="000000"/>
-                </a:solidFill>
-                <a:latin typeface="Calibri"/>
-                <a:cs typeface="Calibri"/>
-              </a:rPr>
-              <a:t>Sketch</a:t>
+              <a:t>Secure Sketch</a:t>
             </a:r>
           </a:p>
           <a:p>
@@ -5092,13 +5063,6 @@
               </a:rPr>
               <a:t>Entropy losses keep fuzzy extractors from being usable for many sources</a:t>
             </a:r>
-            <a:endParaRPr lang="en-US" sz="2000" dirty="0" smtClean="0">
-              <a:solidFill>
-                <a:srgbClr val="000000"/>
-              </a:solidFill>
-              <a:latin typeface="Calibri"/>
-              <a:cs typeface="Calibri"/>
-            </a:endParaRPr>
           </a:p>
           <a:p>
             <a:endParaRPr lang="en-US" sz="2400" dirty="0" smtClean="0">
@@ -5818,14 +5782,12 @@
       <p:cxnSp>
         <p:nvCxnSpPr>
           <p:cNvPr id="111" name="Elbow Connector 110"/>
-          <p:cNvCxnSpPr>
-            <a:endCxn id="113" idx="2"/>
-          </p:cNvCxnSpPr>
+          <p:cNvCxnSpPr/>
           <p:nvPr/>
         </p:nvCxnSpPr>
         <p:spPr>
           <a:xfrm rot="10800000" flipH="1" flipV="1">
-            <a:off x="5156087" y="3757374"/>
+            <a:off x="5167632" y="3757374"/>
             <a:ext cx="622203" cy="519762"/>
           </a:xfrm>
           <a:prstGeom prst="bentConnector3">
@@ -6080,7 +6042,7 @@
                             </p:stCondLst>
                             <p:childTnLst>
                               <p:par>
-                                <p:cTn id="5" presetID="10" presetClass="entr" presetSubtype="0" fill="hold" grpId="0" nodeType="clickEffect">
+                                <p:cTn id="5" presetID="10" presetClass="entr" presetSubtype="0" fill="hold" nodeType="clickEffect">
                                   <p:stCondLst>
                                     <p:cond delay="0"/>
                                   </p:stCondLst>
@@ -6093,7 +6055,11 @@
                                           </p:stCondLst>
                                         </p:cTn>
                                         <p:tgtEl>
-                                          <p:spTgt spid="51"/>
+                                          <p:spTgt spid="5">
+                                            <p:txEl>
+                                              <p:pRg st="3" end="3"/>
+                                            </p:txEl>
+                                          </p:spTgt>
                                         </p:tgtEl>
                                         <p:attrNameLst>
                                           <p:attrName>style.visibility</p:attrName>
@@ -6107,7 +6073,11 @@
                                       <p:cBhvr>
                                         <p:cTn id="7" dur="500"/>
                                         <p:tgtEl>
-                                          <p:spTgt spid="51"/>
+                                          <p:spTgt spid="5">
+                                            <p:txEl>
+                                              <p:pRg st="3" end="3"/>
+                                            </p:txEl>
+                                          </p:spTgt>
                                         </p:tgtEl>
                                       </p:cBhvr>
                                     </p:animEffect>
@@ -6115,7 +6085,7 @@
                                 </p:cTn>
                               </p:par>
                               <p:par>
-                                <p:cTn id="8" presetID="10" presetClass="entr" presetSubtype="0" fill="hold" grpId="0" nodeType="withEffect">
+                                <p:cTn id="8" presetID="10" presetClass="entr" presetSubtype="0" fill="hold" nodeType="withEffect">
                                   <p:stCondLst>
                                     <p:cond delay="0"/>
                                   </p:stCondLst>
@@ -6128,7 +6098,11 @@
                                           </p:stCondLst>
                                         </p:cTn>
                                         <p:tgtEl>
-                                          <p:spTgt spid="52"/>
+                                          <p:spTgt spid="5">
+                                            <p:txEl>
+                                              <p:pRg st="4" end="4"/>
+                                            </p:txEl>
+                                          </p:spTgt>
                                         </p:tgtEl>
                                         <p:attrNameLst>
                                           <p:attrName>style.visibility</p:attrName>
@@ -6142,7 +6116,11 @@
                                       <p:cBhvr>
                                         <p:cTn id="10" dur="500"/>
                                         <p:tgtEl>
-                                          <p:spTgt spid="52"/>
+                                          <p:spTgt spid="5">
+                                            <p:txEl>
+                                              <p:pRg st="4" end="4"/>
+                                            </p:txEl>
+                                          </p:spTgt>
                                         </p:tgtEl>
                                       </p:cBhvr>
                                     </p:animEffect>
@@ -6163,7 +6141,11 @@
                                           </p:stCondLst>
                                         </p:cTn>
                                         <p:tgtEl>
-                                          <p:spTgt spid="53"/>
+                                          <p:spTgt spid="5">
+                                            <p:txEl>
+                                              <p:pRg st="5" end="5"/>
+                                            </p:txEl>
+                                          </p:spTgt>
                                         </p:tgtEl>
                                         <p:attrNameLst>
                                           <p:attrName>style.visibility</p:attrName>
@@ -6177,6 +6159,133 @@
                                       <p:cBhvr>
                                         <p:cTn id="13" dur="500"/>
                                         <p:tgtEl>
+                                          <p:spTgt spid="5">
+                                            <p:txEl>
+                                              <p:pRg st="5" end="5"/>
+                                            </p:txEl>
+                                          </p:spTgt>
+                                        </p:tgtEl>
+                                      </p:cBhvr>
+                                    </p:animEffect>
+                                  </p:childTnLst>
+                                </p:cTn>
+                              </p:par>
+                            </p:childTnLst>
+                          </p:cTn>
+                        </p:par>
+                      </p:childTnLst>
+                    </p:cTn>
+                  </p:par>
+                  <p:par>
+                    <p:cTn id="14" fill="hold">
+                      <p:stCondLst>
+                        <p:cond delay="indefinite"/>
+                      </p:stCondLst>
+                      <p:childTnLst>
+                        <p:par>
+                          <p:cTn id="15" fill="hold">
+                            <p:stCondLst>
+                              <p:cond delay="0"/>
+                            </p:stCondLst>
+                            <p:childTnLst>
+                              <p:par>
+                                <p:cTn id="16" presetID="10" presetClass="entr" presetSubtype="0" fill="hold" grpId="0" nodeType="clickEffect">
+                                  <p:stCondLst>
+                                    <p:cond delay="0"/>
+                                  </p:stCondLst>
+                                  <p:childTnLst>
+                                    <p:set>
+                                      <p:cBhvr>
+                                        <p:cTn id="17" dur="1" fill="hold">
+                                          <p:stCondLst>
+                                            <p:cond delay="0"/>
+                                          </p:stCondLst>
+                                        </p:cTn>
+                                        <p:tgtEl>
+                                          <p:spTgt spid="51"/>
+                                        </p:tgtEl>
+                                        <p:attrNameLst>
+                                          <p:attrName>style.visibility</p:attrName>
+                                        </p:attrNameLst>
+                                      </p:cBhvr>
+                                      <p:to>
+                                        <p:strVal val="visible"/>
+                                      </p:to>
+                                    </p:set>
+                                    <p:animEffect transition="in" filter="fade">
+                                      <p:cBhvr>
+                                        <p:cTn id="18" dur="500"/>
+                                        <p:tgtEl>
+                                          <p:spTgt spid="51"/>
+                                        </p:tgtEl>
+                                      </p:cBhvr>
+                                    </p:animEffect>
+                                  </p:childTnLst>
+                                </p:cTn>
+                              </p:par>
+                              <p:par>
+                                <p:cTn id="19" presetID="10" presetClass="entr" presetSubtype="0" fill="hold" grpId="0" nodeType="withEffect">
+                                  <p:stCondLst>
+                                    <p:cond delay="0"/>
+                                  </p:stCondLst>
+                                  <p:childTnLst>
+                                    <p:set>
+                                      <p:cBhvr>
+                                        <p:cTn id="20" dur="1" fill="hold">
+                                          <p:stCondLst>
+                                            <p:cond delay="0"/>
+                                          </p:stCondLst>
+                                        </p:cTn>
+                                        <p:tgtEl>
+                                          <p:spTgt spid="52"/>
+                                        </p:tgtEl>
+                                        <p:attrNameLst>
+                                          <p:attrName>style.visibility</p:attrName>
+                                        </p:attrNameLst>
+                                      </p:cBhvr>
+                                      <p:to>
+                                        <p:strVal val="visible"/>
+                                      </p:to>
+                                    </p:set>
+                                    <p:animEffect transition="in" filter="fade">
+                                      <p:cBhvr>
+                                        <p:cTn id="21" dur="500"/>
+                                        <p:tgtEl>
+                                          <p:spTgt spid="52"/>
+                                        </p:tgtEl>
+                                      </p:cBhvr>
+                                    </p:animEffect>
+                                  </p:childTnLst>
+                                </p:cTn>
+                              </p:par>
+                              <p:par>
+                                <p:cTn id="22" presetID="10" presetClass="entr" presetSubtype="0" fill="hold" nodeType="withEffect">
+                                  <p:stCondLst>
+                                    <p:cond delay="0"/>
+                                  </p:stCondLst>
+                                  <p:childTnLst>
+                                    <p:set>
+                                      <p:cBhvr>
+                                        <p:cTn id="23" dur="1" fill="hold">
+                                          <p:stCondLst>
+                                            <p:cond delay="0"/>
+                                          </p:stCondLst>
+                                        </p:cTn>
+                                        <p:tgtEl>
+                                          <p:spTgt spid="53"/>
+                                        </p:tgtEl>
+                                        <p:attrNameLst>
+                                          <p:attrName>style.visibility</p:attrName>
+                                        </p:attrNameLst>
+                                      </p:cBhvr>
+                                      <p:to>
+                                        <p:strVal val="visible"/>
+                                      </p:to>
+                                    </p:set>
+                                    <p:animEffect transition="in" filter="fade">
+                                      <p:cBhvr>
+                                        <p:cTn id="24" dur="500"/>
+                                        <p:tgtEl>
                                           <p:spTgt spid="53"/>
                                         </p:tgtEl>
                                       </p:cBhvr>
@@ -6185,14 +6294,14 @@
                                 </p:cTn>
                               </p:par>
                               <p:par>
-                                <p:cTn id="14" presetID="10" presetClass="entr" presetSubtype="0" fill="hold" nodeType="withEffect">
+                                <p:cTn id="25" presetID="10" presetClass="entr" presetSubtype="0" fill="hold" nodeType="withEffect">
                                   <p:stCondLst>
                                     <p:cond delay="0"/>
                                   </p:stCondLst>
                                   <p:childTnLst>
                                     <p:set>
                                       <p:cBhvr>
-                                        <p:cTn id="15" dur="1" fill="hold">
+                                        <p:cTn id="26" dur="1" fill="hold">
                                           <p:stCondLst>
                                             <p:cond delay="0"/>
                                           </p:stCondLst>
@@ -6210,7 +6319,7 @@
                                     </p:set>
                                     <p:animEffect transition="in" filter="fade">
                                       <p:cBhvr>
-                                        <p:cTn id="16" dur="500"/>
+                                        <p:cTn id="27" dur="500"/>
                                         <p:tgtEl>
                                           <p:spTgt spid="56"/>
                                         </p:tgtEl>
@@ -6220,14 +6329,14 @@
                                 </p:cTn>
                               </p:par>
                               <p:par>
-                                <p:cTn id="17" presetID="10" presetClass="entr" presetSubtype="0" fill="hold" nodeType="withEffect">
+                                <p:cTn id="28" presetID="10" presetClass="entr" presetSubtype="0" fill="hold" nodeType="withEffect">
                                   <p:stCondLst>
                                     <p:cond delay="0"/>
                                   </p:stCondLst>
                                   <p:childTnLst>
                                     <p:set>
                                       <p:cBhvr>
-                                        <p:cTn id="18" dur="1" fill="hold">
+                                        <p:cTn id="29" dur="1" fill="hold">
                                           <p:stCondLst>
                                             <p:cond delay="0"/>
                                           </p:stCondLst>
@@ -6245,7 +6354,7 @@
                                     </p:set>
                                     <p:animEffect transition="in" filter="fade">
                                       <p:cBhvr>
-                                        <p:cTn id="19" dur="500"/>
+                                        <p:cTn id="30" dur="500"/>
                                         <p:tgtEl>
                                           <p:spTgt spid="57"/>
                                         </p:tgtEl>
@@ -6255,14 +6364,14 @@
                                 </p:cTn>
                               </p:par>
                               <p:par>
-                                <p:cTn id="20" presetID="10" presetClass="entr" presetSubtype="0" fill="hold" nodeType="withEffect">
+                                <p:cTn id="31" presetID="10" presetClass="entr" presetSubtype="0" fill="hold" nodeType="withEffect">
                                   <p:stCondLst>
                                     <p:cond delay="0"/>
                                   </p:stCondLst>
                                   <p:childTnLst>
                                     <p:set>
                                       <p:cBhvr>
-                                        <p:cTn id="21" dur="1" fill="hold">
+                                        <p:cTn id="32" dur="1" fill="hold">
                                           <p:stCondLst>
                                             <p:cond delay="0"/>
                                           </p:stCondLst>
@@ -6280,7 +6389,7 @@
                                     </p:set>
                                     <p:animEffect transition="in" filter="fade">
                                       <p:cBhvr>
-                                        <p:cTn id="22" dur="500"/>
+                                        <p:cTn id="33" dur="500"/>
                                         <p:tgtEl>
                                           <p:spTgt spid="94"/>
                                         </p:tgtEl>
@@ -6290,14 +6399,14 @@
                                 </p:cTn>
                               </p:par>
                               <p:par>
-                                <p:cTn id="23" presetID="10" presetClass="entr" presetSubtype="0" fill="hold" grpId="0" nodeType="withEffect">
+                                <p:cTn id="34" presetID="10" presetClass="entr" presetSubtype="0" fill="hold" grpId="0" nodeType="withEffect">
                                   <p:stCondLst>
                                     <p:cond delay="0"/>
                                   </p:stCondLst>
                                   <p:childTnLst>
                                     <p:set>
                                       <p:cBhvr>
-                                        <p:cTn id="24" dur="1" fill="hold">
+                                        <p:cTn id="35" dur="1" fill="hold">
                                           <p:stCondLst>
                                             <p:cond delay="0"/>
                                           </p:stCondLst>
@@ -6315,7 +6424,7 @@
                                     </p:set>
                                     <p:animEffect transition="in" filter="fade">
                                       <p:cBhvr>
-                                        <p:cTn id="25" dur="500"/>
+                                        <p:cTn id="36" dur="500"/>
                                         <p:tgtEl>
                                           <p:spTgt spid="102"/>
                                         </p:tgtEl>
@@ -6325,14 +6434,14 @@
                                 </p:cTn>
                               </p:par>
                               <p:par>
-                                <p:cTn id="26" presetID="10" presetClass="entr" presetSubtype="0" fill="hold" grpId="0" nodeType="withEffect">
+                                <p:cTn id="37" presetID="10" presetClass="entr" presetSubtype="0" fill="hold" grpId="0" nodeType="withEffect">
                                   <p:stCondLst>
                                     <p:cond delay="0"/>
                                   </p:stCondLst>
                                   <p:childTnLst>
                                     <p:set>
                                       <p:cBhvr>
-                                        <p:cTn id="27" dur="1" fill="hold">
+                                        <p:cTn id="38" dur="1" fill="hold">
                                           <p:stCondLst>
                                             <p:cond delay="0"/>
                                           </p:stCondLst>
@@ -6350,7 +6459,7 @@
                                     </p:set>
                                     <p:animEffect transition="in" filter="fade">
                                       <p:cBhvr>
-                                        <p:cTn id="28" dur="500"/>
+                                        <p:cTn id="39" dur="500"/>
                                         <p:tgtEl>
                                           <p:spTgt spid="103"/>
                                         </p:tgtEl>
@@ -6360,14 +6469,14 @@
                                 </p:cTn>
                               </p:par>
                               <p:par>
-                                <p:cTn id="29" presetID="10" presetClass="entr" presetSubtype="0" fill="hold" grpId="0" nodeType="withEffect">
+                                <p:cTn id="40" presetID="10" presetClass="entr" presetSubtype="0" fill="hold" grpId="0" nodeType="withEffect">
                                   <p:stCondLst>
                                     <p:cond delay="0"/>
                                   </p:stCondLst>
                                   <p:childTnLst>
                                     <p:set>
                                       <p:cBhvr>
-                                        <p:cTn id="30" dur="1" fill="hold">
+                                        <p:cTn id="41" dur="1" fill="hold">
                                           <p:stCondLst>
                                             <p:cond delay="0"/>
                                           </p:stCondLst>
@@ -6385,7 +6494,7 @@
                                     </p:set>
                                     <p:animEffect transition="in" filter="fade">
                                       <p:cBhvr>
-                                        <p:cTn id="31" dur="500"/>
+                                        <p:cTn id="42" dur="500"/>
                                         <p:tgtEl>
                                           <p:spTgt spid="104"/>
                                         </p:tgtEl>
@@ -6395,14 +6504,14 @@
                                 </p:cTn>
                               </p:par>
                               <p:par>
-                                <p:cTn id="32" presetID="10" presetClass="entr" presetSubtype="0" fill="hold" nodeType="withEffect">
+                                <p:cTn id="43" presetID="10" presetClass="entr" presetSubtype="0" fill="hold" nodeType="withEffect">
                                   <p:stCondLst>
                                     <p:cond delay="0"/>
                                   </p:stCondLst>
                                   <p:childTnLst>
                                     <p:set>
                                       <p:cBhvr>
-                                        <p:cTn id="33" dur="1" fill="hold">
+                                        <p:cTn id="44" dur="1" fill="hold">
                                           <p:stCondLst>
                                             <p:cond delay="0"/>
                                           </p:stCondLst>
@@ -6420,7 +6529,7 @@
                                     </p:set>
                                     <p:animEffect transition="in" filter="fade">
                                       <p:cBhvr>
-                                        <p:cTn id="34" dur="500"/>
+                                        <p:cTn id="45" dur="500"/>
                                         <p:tgtEl>
                                           <p:spTgt spid="106"/>
                                         </p:tgtEl>
@@ -6430,14 +6539,14 @@
                                 </p:cTn>
                               </p:par>
                               <p:par>
-                                <p:cTn id="35" presetID="10" presetClass="entr" presetSubtype="0" fill="hold" nodeType="withEffect">
+                                <p:cTn id="46" presetID="10" presetClass="entr" presetSubtype="0" fill="hold" nodeType="withEffect">
                                   <p:stCondLst>
                                     <p:cond delay="0"/>
                                   </p:stCondLst>
                                   <p:childTnLst>
                                     <p:set>
                                       <p:cBhvr>
-                                        <p:cTn id="36" dur="1" fill="hold">
+                                        <p:cTn id="47" dur="1" fill="hold">
                                           <p:stCondLst>
                                             <p:cond delay="0"/>
                                           </p:stCondLst>
@@ -6455,7 +6564,7 @@
                                     </p:set>
                                     <p:animEffect transition="in" filter="fade">
                                       <p:cBhvr>
-                                        <p:cTn id="37" dur="500"/>
+                                        <p:cTn id="48" dur="500"/>
                                         <p:tgtEl>
                                           <p:spTgt spid="107"/>
                                         </p:tgtEl>
@@ -6465,14 +6574,14 @@
                                 </p:cTn>
                               </p:par>
                               <p:par>
-                                <p:cTn id="38" presetID="10" presetClass="entr" presetSubtype="0" fill="hold" nodeType="withEffect">
+                                <p:cTn id="49" presetID="10" presetClass="entr" presetSubtype="0" fill="hold" nodeType="withEffect">
                                   <p:stCondLst>
                                     <p:cond delay="0"/>
                                   </p:stCondLst>
                                   <p:childTnLst>
                                     <p:set>
                                       <p:cBhvr>
-                                        <p:cTn id="39" dur="1" fill="hold">
+                                        <p:cTn id="50" dur="1" fill="hold">
                                           <p:stCondLst>
                                             <p:cond delay="0"/>
                                           </p:stCondLst>
@@ -6490,7 +6599,7 @@
                                     </p:set>
                                     <p:animEffect transition="in" filter="fade">
                                       <p:cBhvr>
-                                        <p:cTn id="40" dur="500"/>
+                                        <p:cTn id="51" dur="500"/>
                                         <p:tgtEl>
                                           <p:spTgt spid="110"/>
                                         </p:tgtEl>
@@ -6500,14 +6609,14 @@
                                 </p:cTn>
                               </p:par>
                               <p:par>
-                                <p:cTn id="41" presetID="10" presetClass="entr" presetSubtype="0" fill="hold" nodeType="withEffect">
+                                <p:cTn id="52" presetID="10" presetClass="entr" presetSubtype="0" fill="hold" nodeType="withEffect">
                                   <p:stCondLst>
                                     <p:cond delay="0"/>
                                   </p:stCondLst>
                                   <p:childTnLst>
                                     <p:set>
                                       <p:cBhvr>
-                                        <p:cTn id="42" dur="1" fill="hold">
+                                        <p:cTn id="53" dur="1" fill="hold">
                                           <p:stCondLst>
                                             <p:cond delay="0"/>
                                           </p:stCondLst>
@@ -6525,7 +6634,7 @@
                                     </p:set>
                                     <p:animEffect transition="in" filter="fade">
                                       <p:cBhvr>
-                                        <p:cTn id="43" dur="500"/>
+                                        <p:cTn id="54" dur="500"/>
                                         <p:tgtEl>
                                           <p:spTgt spid="111"/>
                                         </p:tgtEl>
@@ -6535,14 +6644,14 @@
                                 </p:cTn>
                               </p:par>
                               <p:par>
-                                <p:cTn id="44" presetID="10" presetClass="entr" presetSubtype="0" fill="hold" nodeType="withEffect">
+                                <p:cTn id="55" presetID="10" presetClass="entr" presetSubtype="0" fill="hold" nodeType="withEffect">
                                   <p:stCondLst>
                                     <p:cond delay="0"/>
                                   </p:stCondLst>
                                   <p:childTnLst>
                                     <p:set>
                                       <p:cBhvr>
-                                        <p:cTn id="45" dur="1" fill="hold">
+                                        <p:cTn id="56" dur="1" fill="hold">
                                           <p:stCondLst>
                                             <p:cond delay="0"/>
                                           </p:stCondLst>
@@ -6560,7 +6669,7 @@
                                     </p:set>
                                     <p:animEffect transition="in" filter="fade">
                                       <p:cBhvr>
-                                        <p:cTn id="46" dur="500"/>
+                                        <p:cTn id="57" dur="500"/>
                                         <p:tgtEl>
                                           <p:spTgt spid="112"/>
                                         </p:tgtEl>
@@ -6570,14 +6679,14 @@
                                 </p:cTn>
                               </p:par>
                               <p:par>
-                                <p:cTn id="47" presetID="10" presetClass="entr" presetSubtype="0" fill="hold" nodeType="withEffect">
+                                <p:cTn id="58" presetID="10" presetClass="entr" presetSubtype="0" fill="hold" nodeType="withEffect">
                                   <p:stCondLst>
                                     <p:cond delay="0"/>
                                   </p:stCondLst>
                                   <p:childTnLst>
                                     <p:set>
                                       <p:cBhvr>
-                                        <p:cTn id="48" dur="1" fill="hold">
+                                        <p:cTn id="59" dur="1" fill="hold">
                                           <p:stCondLst>
                                             <p:cond delay="0"/>
                                           </p:stCondLst>
@@ -6595,7 +6704,7 @@
                                     </p:set>
                                     <p:animEffect transition="in" filter="fade">
                                       <p:cBhvr>
-                                        <p:cTn id="49" dur="500"/>
+                                        <p:cTn id="60" dur="500"/>
                                         <p:tgtEl>
                                           <p:spTgt spid="115"/>
                                         </p:tgtEl>
@@ -6611,26 +6720,26 @@
                     </p:cTn>
                   </p:par>
                   <p:par>
-                    <p:cTn id="50" fill="hold">
+                    <p:cTn id="61" fill="hold">
                       <p:stCondLst>
                         <p:cond delay="indefinite"/>
                       </p:stCondLst>
                       <p:childTnLst>
                         <p:par>
-                          <p:cTn id="51" fill="hold">
+                          <p:cTn id="62" fill="hold">
                             <p:stCondLst>
                               <p:cond delay="0"/>
                             </p:stCondLst>
                             <p:childTnLst>
                               <p:par>
-                                <p:cTn id="52" presetID="10" presetClass="entr" presetSubtype="0" fill="hold" nodeType="clickEffect">
+                                <p:cTn id="63" presetID="10" presetClass="entr" presetSubtype="0" fill="hold" nodeType="clickEffect">
                                   <p:stCondLst>
                                     <p:cond delay="0"/>
                                   </p:stCondLst>
                                   <p:childTnLst>
                                     <p:set>
                                       <p:cBhvr>
-                                        <p:cTn id="53" dur="1" fill="hold">
+                                        <p:cTn id="64" dur="1" fill="hold">
                                           <p:stCondLst>
                                             <p:cond delay="0"/>
                                           </p:stCondLst>
@@ -6652,7 +6761,7 @@
                                     </p:set>
                                     <p:animEffect transition="in" filter="fade">
                                       <p:cBhvr>
-                                        <p:cTn id="54" dur="500"/>
+                                        <p:cTn id="65" dur="500"/>
                                         <p:tgtEl>
                                           <p:spTgt spid="5">
                                             <p:txEl>
@@ -6666,14 +6775,14 @@
                                 </p:cTn>
                               </p:par>
                               <p:par>
-                                <p:cTn id="55" presetID="10" presetClass="entr" presetSubtype="0" fill="hold" nodeType="withEffect">
+                                <p:cTn id="66" presetID="10" presetClass="entr" presetSubtype="0" fill="hold" nodeType="withEffect">
                                   <p:stCondLst>
                                     <p:cond delay="0"/>
                                   </p:stCondLst>
                                   <p:childTnLst>
                                     <p:set>
                                       <p:cBhvr>
-                                        <p:cTn id="56" dur="1" fill="hold">
+                                        <p:cTn id="67" dur="1" fill="hold">
                                           <p:stCondLst>
                                             <p:cond delay="0"/>
                                           </p:stCondLst>
@@ -6695,7 +6804,7 @@
                                     </p:set>
                                     <p:animEffect transition="in" filter="fade">
                                       <p:cBhvr>
-                                        <p:cTn id="57" dur="500"/>
+                                        <p:cTn id="68" dur="500"/>
                                         <p:tgtEl>
                                           <p:spTgt spid="5">
                                             <p:txEl>
@@ -6715,26 +6824,26 @@
                     </p:cTn>
                   </p:par>
                   <p:par>
-                    <p:cTn id="58" fill="hold">
+                    <p:cTn id="69" fill="hold">
                       <p:stCondLst>
                         <p:cond delay="indefinite"/>
                       </p:stCondLst>
                       <p:childTnLst>
                         <p:par>
-                          <p:cTn id="59" fill="hold">
+                          <p:cTn id="70" fill="hold">
                             <p:stCondLst>
                               <p:cond delay="0"/>
                             </p:stCondLst>
                             <p:childTnLst>
                               <p:par>
-                                <p:cTn id="60" presetID="10" presetClass="entr" presetSubtype="0" fill="hold" grpId="0" nodeType="clickEffect">
+                                <p:cTn id="71" presetID="10" presetClass="entr" presetSubtype="0" fill="hold" grpId="0" nodeType="clickEffect">
                                   <p:stCondLst>
                                     <p:cond delay="0"/>
                                   </p:stCondLst>
                                   <p:childTnLst>
                                     <p:set>
                                       <p:cBhvr>
-                                        <p:cTn id="61" dur="1" fill="hold">
+                                        <p:cTn id="72" dur="1" fill="hold">
                                           <p:stCondLst>
                                             <p:cond delay="0"/>
                                           </p:stCondLst>
@@ -6754,7 +6863,7 @@
                                     </p:set>
                                     <p:animEffect transition="in" filter="fade">
                                       <p:cBhvr>
-                                        <p:cTn id="62" dur="500"/>
+                                        <p:cTn id="73" dur="500"/>
                                         <p:tgtEl>
                                           <p:spTgt spid="7">
                                             <p:bg/>
@@ -6766,14 +6875,14 @@
                                 </p:cTn>
                               </p:par>
                               <p:par>
-                                <p:cTn id="63" presetID="10" presetClass="entr" presetSubtype="0" fill="hold" grpId="0" nodeType="withEffect">
+                                <p:cTn id="74" presetID="10" presetClass="entr" presetSubtype="0" fill="hold" grpId="0" nodeType="withEffect">
                                   <p:stCondLst>
                                     <p:cond delay="0"/>
                                   </p:stCondLst>
                                   <p:childTnLst>
                                     <p:set>
                                       <p:cBhvr>
-                                        <p:cTn id="64" dur="1" fill="hold">
+                                        <p:cTn id="75" dur="1" fill="hold">
                                           <p:stCondLst>
                                             <p:cond delay="0"/>
                                           </p:stCondLst>
@@ -6795,7 +6904,7 @@
                                     </p:set>
                                     <p:animEffect transition="in" filter="fade">
                                       <p:cBhvr>
-                                        <p:cTn id="65" dur="500"/>
+                                        <p:cTn id="76" dur="500"/>
                                         <p:tgtEl>
                                           <p:spTgt spid="7">
                                             <p:txEl>
@@ -6872,7 +6981,7 @@
         </p:nvSpPr>
         <p:spPr bwMode="auto">
           <a:xfrm rot="5400000">
-            <a:off x="5651631" y="2963012"/>
+            <a:off x="5651631" y="2951467"/>
             <a:ext cx="1044618" cy="762976"/>
           </a:xfrm>
           <a:prstGeom prst="trapezoid">
@@ -7032,14 +7141,7 @@
                 <a:latin typeface="Calibri"/>
                 <a:cs typeface="Calibri"/>
               </a:rPr>
-              <a:t> </a:t>
-            </a:r>
-            <a:r>
-              <a:rPr lang="en-US" sz="2200" dirty="0" smtClean="0">
-                <a:latin typeface="Calibri"/>
-                <a:cs typeface="Calibri"/>
-              </a:rPr>
-              <a:t>Defining secure sketches</a:t>
+              <a:t> Defining secure sketches</a:t>
             </a:r>
             <a:br>
               <a:rPr lang="en-US" sz="2200" dirty="0" smtClean="0">
@@ -7078,24 +7180,15 @@
           <a:p>
             <a:r>
               <a:rPr lang="en-US" sz="2800" dirty="0" smtClean="0"/>
-              <a:t>Using a new construction: </a:t>
-            </a:r>
-            <a:r>
-              <a:rPr lang="en-US" sz="2800" dirty="0" smtClean="0"/>
-              <a:t>YES</a:t>
+              <a:t>Using a new construction: YES</a:t>
             </a:r>
           </a:p>
           <a:p>
             <a:pPr lvl="1"/>
             <a:r>
               <a:rPr lang="en-US" sz="2200" dirty="0" smtClean="0"/>
-              <a:t>Know we </a:t>
-            </a:r>
-            <a:r>
-              <a:rPr lang="en-US" sz="2200" dirty="0" smtClean="0"/>
-              <a:t>can’t change the sketch</a:t>
-            </a:r>
-            <a:endParaRPr lang="en-US" sz="2200" dirty="0" smtClean="0"/>
+              <a:t>Know we can’t change the sketch</a:t>
+            </a:r>
           </a:p>
           <a:p>
             <a:pPr lvl="1"/>
@@ -7122,11 +7215,7 @@
             <a:pPr lvl="1"/>
             <a:r>
               <a:rPr lang="en-US" sz="2200" dirty="0" smtClean="0"/>
-              <a:t>We </a:t>
-            </a:r>
-            <a:r>
-              <a:rPr lang="en-US" sz="2200" dirty="0" smtClean="0"/>
-              <a:t>make the whole process computational</a:t>
+              <a:t>We make the whole process computational</a:t>
             </a:r>
           </a:p>
           <a:p>
@@ -7784,14 +7873,12 @@
       <p:cxnSp>
         <p:nvCxnSpPr>
           <p:cNvPr id="20" name="Elbow Connector 19"/>
-          <p:cNvCxnSpPr>
-            <a:endCxn id="22" idx="2"/>
-          </p:cNvCxnSpPr>
+          <p:cNvCxnSpPr/>
           <p:nvPr/>
         </p:nvCxnSpPr>
         <p:spPr>
           <a:xfrm rot="10800000" flipH="1" flipV="1">
-            <a:off x="5156087" y="3757374"/>
+            <a:off x="5167632" y="3757374"/>
             <a:ext cx="622203" cy="519762"/>
           </a:xfrm>
           <a:prstGeom prst="bentConnector3">
@@ -9164,20 +9251,11 @@
               <a:rPr lang="en-US" sz="2200" dirty="0" smtClean="0"/>
               <a:t>Our encryption algorithm is the “code-offset” secure sketch instantiated with random linear code (security from LWE)</a:t>
             </a:r>
-            <a:endParaRPr lang="en-US" sz="2200" dirty="0" smtClean="0"/>
           </a:p>
           <a:p>
             <a:r>
               <a:rPr lang="en-US" sz="2200" dirty="0" smtClean="0"/>
-              <a:t>First fuzzy </a:t>
-            </a:r>
-            <a:r>
-              <a:rPr lang="en-US" sz="2200" dirty="0" smtClean="0"/>
-              <a:t>extractor where </a:t>
-            </a:r>
-            <a:r>
-              <a:rPr lang="en-US" sz="2200" dirty="0" smtClean="0"/>
-              <a:t/>
+              <a:t>First fuzzy extractor where </a:t>
             </a:r>
             <a:br>
               <a:rPr lang="en-US" sz="2200" dirty="0" smtClean="0"/>
@@ -10576,13 +10654,100 @@
         </p:nvSpPr>
         <p:spPr>
           <a:xfrm>
-            <a:off x="254000" y="999692"/>
+            <a:off x="87746" y="0"/>
+            <a:ext cx="3722255" cy="1143000"/>
+          </a:xfrm>
+        </p:spPr>
+        <p:txBody>
+          <a:bodyPr/>
+          <a:lstStyle/>
+          <a:p>
+            <a:pPr algn="l"/>
+            <a:r>
+              <a:rPr lang="en-US" dirty="0" smtClean="0"/>
+              <a:t>Open Problems</a:t>
+            </a:r>
+            <a:endParaRPr lang="en-US" dirty="0"/>
+          </a:p>
+        </p:txBody>
+      </p:sp>
+      <p:sp>
+        <p:nvSpPr>
+          <p:cNvPr id="3" name="Content Placeholder 2"/>
+          <p:cNvSpPr>
+            <a:spLocks noGrp="1"/>
+          </p:cNvSpPr>
+          <p:nvPr>
+            <p:ph idx="1"/>
+          </p:nvPr>
+        </p:nvSpPr>
+        <p:spPr>
+          <a:xfrm>
+            <a:off x="457199" y="1143000"/>
+            <a:ext cx="8455891" cy="4525963"/>
+          </a:xfrm>
+        </p:spPr>
+        <p:txBody>
+          <a:bodyPr/>
+          <a:lstStyle/>
+          <a:p>
+            <a:r>
+              <a:rPr lang="en-US" dirty="0" smtClean="0"/>
+              <a:t>Security for arbitrary high entropy distributions</a:t>
+            </a:r>
+          </a:p>
+          <a:p>
+            <a:r>
+              <a:rPr lang="en-US" smtClean="0"/>
+              <a:t>Efficient reproduction for </a:t>
+            </a:r>
+            <a:r>
+              <a:rPr lang="en-US" dirty="0" smtClean="0"/>
+              <a:t>constant error rate</a:t>
+            </a:r>
+          </a:p>
+          <a:p>
+            <a:endParaRPr lang="en-US" dirty="0"/>
+          </a:p>
+        </p:txBody>
+      </p:sp>
+      <p:sp>
+        <p:nvSpPr>
+          <p:cNvPr id="4" name="Title 1"/>
+          <p:cNvSpPr txBox="1">
+            <a:spLocks/>
+          </p:cNvSpPr>
+          <p:nvPr/>
+        </p:nvSpPr>
+        <p:spPr>
+          <a:xfrm>
+            <a:off x="457199" y="2881602"/>
             <a:ext cx="8229600" cy="1143000"/>
           </a:xfrm>
+          <a:prstGeom prst="rect">
+            <a:avLst/>
+          </a:prstGeom>
         </p:spPr>
         <p:txBody>
-          <a:bodyPr/>
-          <a:lstStyle/>
+          <a:bodyPr vert="horz" lIns="91440" tIns="45720" rIns="91440" bIns="45720" rtlCol="0" anchor="ctr">
+            <a:normAutofit/>
+          </a:bodyPr>
+          <a:lstStyle>
+            <a:lvl1pPr algn="ctr" defTabSz="457200" rtl="0" eaLnBrk="1" latinLnBrk="0" hangingPunct="1">
+              <a:spcBef>
+                <a:spcPct val="0"/>
+              </a:spcBef>
+              <a:buNone/>
+              <a:defRPr sz="4400" kern="1200">
+                <a:solidFill>
+                  <a:schemeClr val="tx1"/>
+                </a:solidFill>
+                <a:latin typeface="+mj-lt"/>
+                <a:ea typeface="+mj-ea"/>
+                <a:cs typeface="+mj-cs"/>
+              </a:defRPr>
+            </a:lvl1pPr>
+          </a:lstStyle>
           <a:p>
             <a:r>
               <a:rPr lang="en-US" dirty="0" smtClean="0"/>
@@ -10594,14 +10759,14 @@
       </p:sp>
       <p:sp>
         <p:nvSpPr>
-          <p:cNvPr id="3" name="TextBox 2"/>
+          <p:cNvPr id="5" name="TextBox 4"/>
           <p:cNvSpPr txBox="1"/>
           <p:nvPr/>
         </p:nvSpPr>
         <p:spPr>
           <a:xfrm>
-            <a:off x="1642233" y="3602181"/>
-            <a:ext cx="5453135" cy="2062103"/>
+            <a:off x="1907780" y="4179455"/>
+            <a:ext cx="5453135" cy="2554545"/>
           </a:xfrm>
           <a:prstGeom prst="rect">
             <a:avLst/>
@@ -10617,6 +10782,21 @@
             <a:pPr algn="ctr"/>
             <a:r>
               <a:rPr lang="en-US" sz="3200" dirty="0" smtClean="0"/>
+              <a:t>To appear at </a:t>
+            </a:r>
+            <a:r>
+              <a:rPr lang="en-US" sz="3200" dirty="0" err="1" smtClean="0"/>
+              <a:t>Asiacrypt</a:t>
+            </a:r>
+            <a:r>
+              <a:rPr lang="en-US" sz="3200" dirty="0" smtClean="0"/>
+              <a:t> ‘13</a:t>
+            </a:r>
+            <a:br>
+              <a:rPr lang="en-US" sz="3200" dirty="0" smtClean="0"/>
+            </a:br>
+            <a:r>
+              <a:rPr lang="en-US" sz="3200" dirty="0" smtClean="0"/>
               <a:t>Available:</a:t>
             </a:r>
             <a:endParaRPr lang="en-US" sz="3200" dirty="0" smtClean="0">
@@ -10657,7 +10837,7 @@
     </p:spTree>
     <p:extLst>
       <p:ext uri="{BB962C8B-B14F-4D97-AF65-F5344CB8AC3E}">
-        <p14:creationId xmlns:p14="http://schemas.microsoft.com/office/powerpoint/2010/main" val="2639756856"/>
+        <p14:creationId xmlns:p14="http://schemas.microsoft.com/office/powerpoint/2010/main" val="1149044383"/>
       </p:ext>
     </p:extLst>
   </p:cSld>

</xml_diff>

<commit_message>
Dealing with Asiacrypt reviewer comments
</commit_message>
<xml_diff>
--- a/ComputationalFuzzyExtractors-CryptoRump.pptx
+++ b/ComputationalFuzzyExtractors-CryptoRump.pptx
@@ -5972,7 +5972,7 @@
           <a:p>
             <a:r>
               <a:rPr lang="en-US" sz="2400" dirty="0" smtClean="0"/>
-              <a:t>Current techniques for removing noise impose large entropy losses and prevent use in authentication</a:t>
+              <a:t>Current techniques for removing noise impose large entropy losses and inhibit use in authentication</a:t>
             </a:r>
             <a:endParaRPr lang="en-US" sz="2400" dirty="0"/>
           </a:p>
@@ -6047,7 +6047,7 @@
         <p:spPr>
           <a:xfrm>
             <a:off x="6938818" y="6488668"/>
-            <a:ext cx="1704688" cy="369332"/>
+            <a:ext cx="1118365" cy="369332"/>
           </a:xfrm>
           <a:prstGeom prst="rect">
             <a:avLst/>
@@ -6061,12 +6061,24 @@
           <a:lstStyle/>
           <a:p>
             <a:r>
-              <a:rPr lang="en-US" dirty="0" err="1" smtClean="0"/>
+              <a:rPr lang="en-US" dirty="0" smtClean="0"/>
+              <a:t>[</a:t>
+            </a:r>
+            <a:r>
+              <a:rPr lang="en-US" smtClean="0"/>
               <a:t>Tuyls</a:t>
             </a:r>
             <a:r>
+              <a:rPr lang="en-US" baseline="30000" smtClean="0"/>
+              <a:t>+</a:t>
+            </a:r>
+            <a:r>
+              <a:rPr lang="en-US" smtClean="0"/>
+              <a:t>06</a:t>
+            </a:r>
+            <a:r>
               <a:rPr lang="en-US" dirty="0" smtClean="0"/>
-              <a:t> et al. 2006</a:t>
+              <a:t>]</a:t>
             </a:r>
           </a:p>
         </p:txBody>
@@ -12702,6 +12714,13 @@
               <a:t>Need encryption algorithm that allows decryption from close </a:t>
             </a:r>
             <a:r>
+              <a:rPr lang="en-US" sz="2200" dirty="0" smtClean="0">
+                <a:latin typeface="Calibri"/>
+                <a:cs typeface="Calibri"/>
+              </a:rPr>
+              <a:t>secret key </a:t>
+            </a:r>
+            <a:r>
               <a:rPr lang="en-US" sz="2200" i="1" dirty="0" smtClean="0">
                 <a:latin typeface="Times New Roman"/>
                 <a:cs typeface="Times New Roman"/>

</xml_diff>